<commit_message>
Lösung 04 (XLS) + Lösung 04 in Folien eingebaut
</commit_message>
<xml_diff>
--- a/uebung06/hcs_2013_uebung06.pptx
+++ b/uebung06/hcs_2013_uebung06.pptx
@@ -5,10 +5,10 @@
     <p:sldMasterId id="2147483648" r:id="rId1"/>
   </p:sldMasterIdLst>
   <p:notesMasterIdLst>
-    <p:notesMasterId r:id="rId11"/>
+    <p:notesMasterId r:id="rId12"/>
   </p:notesMasterIdLst>
   <p:handoutMasterIdLst>
-    <p:handoutMasterId r:id="rId12"/>
+    <p:handoutMasterId r:id="rId13"/>
   </p:handoutMasterIdLst>
   <p:sldIdLst>
     <p:sldId id="256" r:id="rId2"/>
@@ -17,9 +17,10 @@
     <p:sldId id="296" r:id="rId5"/>
     <p:sldId id="299" r:id="rId6"/>
     <p:sldId id="300" r:id="rId7"/>
-    <p:sldId id="297" r:id="rId8"/>
-    <p:sldId id="298" r:id="rId9"/>
-    <p:sldId id="266" r:id="rId10"/>
+    <p:sldId id="301" r:id="rId8"/>
+    <p:sldId id="297" r:id="rId9"/>
+    <p:sldId id="298" r:id="rId10"/>
+    <p:sldId id="266" r:id="rId11"/>
   </p:sldIdLst>
   <p:sldSz cx="9144000" cy="6858000" type="screen4x3"/>
   <p:notesSz cx="6858000" cy="9144000"/>
@@ -168,6 +169,776 @@
     </p:ext>
   </p:extLst>
 </p:presentation>
+</file>
+
+<file path=ppt/charts/chart1.xml><?xml version="1.0" encoding="utf-8"?>
+<c:chartSpace xmlns:c="http://schemas.openxmlformats.org/drawingml/2006/chart" xmlns:a="http://schemas.openxmlformats.org/drawingml/2006/main" xmlns:r="http://schemas.openxmlformats.org/officeDocument/2006/relationships">
+  <c:date1904 val="0"/>
+  <c:lang val="en-US"/>
+  <c:roundedCorners val="0"/>
+  <mc:AlternateContent xmlns:mc="http://schemas.openxmlformats.org/markup-compatibility/2006">
+    <mc:Choice xmlns:c14="http://schemas.microsoft.com/office/drawing/2007/8/2/chart" Requires="c14">
+      <c14:style val="107"/>
+    </mc:Choice>
+    <mc:Fallback>
+      <c:style val="7"/>
+    </mc:Fallback>
+  </mc:AlternateContent>
+  <c:clrMapOvr bg1="lt1" tx1="dk1" bg2="lt2" tx2="dk2" accent1="accent1" accent2="accent2" accent3="accent3" accent4="accent4" accent5="accent5" accent6="accent6" hlink="hlink" folHlink="folHlink"/>
+  <c:chart>
+    <c:autoTitleDeleted val="1"/>
+    <c:plotArea>
+      <c:layout/>
+      <c:barChart>
+        <c:barDir val="col"/>
+        <c:grouping val="clustered"/>
+        <c:varyColors val="0"/>
+        <c:ser>
+          <c:idx val="0"/>
+          <c:order val="0"/>
+          <c:tx>
+            <c:strRef>
+              <c:f>Sheet1!$O$12</c:f>
+              <c:strCache>
+                <c:ptCount val="1"/>
+                <c:pt idx="0">
+                  <c:v>Pixel</c:v>
+                </c:pt>
+              </c:strCache>
+            </c:strRef>
+          </c:tx>
+          <c:spPr>
+            <a:gradFill rotWithShape="1">
+              <a:gsLst>
+                <a:gs pos="0">
+                  <a:schemeClr val="accent5">
+                    <a:satMod val="103000"/>
+                    <a:lumMod val="102000"/>
+                    <a:tint val="94000"/>
+                  </a:schemeClr>
+                </a:gs>
+                <a:gs pos="50000">
+                  <a:schemeClr val="accent5">
+                    <a:satMod val="110000"/>
+                    <a:lumMod val="100000"/>
+                    <a:shade val="100000"/>
+                  </a:schemeClr>
+                </a:gs>
+                <a:gs pos="100000">
+                  <a:schemeClr val="accent5">
+                    <a:lumMod val="99000"/>
+                    <a:satMod val="120000"/>
+                    <a:shade val="78000"/>
+                  </a:schemeClr>
+                </a:gs>
+              </a:gsLst>
+              <a:lin ang="5400000" scaled="0"/>
+            </a:gradFill>
+            <a:ln>
+              <a:noFill/>
+            </a:ln>
+            <a:effectLst>
+              <a:outerShdw blurRad="57150" dist="19050" dir="5400000" algn="ctr" rotWithShape="0">
+                <a:srgbClr val="000000">
+                  <a:alpha val="63000"/>
+                </a:srgbClr>
+              </a:outerShdw>
+            </a:effectLst>
+          </c:spPr>
+          <c:invertIfNegative val="0"/>
+          <c:cat>
+            <c:numRef>
+              <c:f>Sheet1!$N$13:$N$20</c:f>
+              <c:numCache>
+                <c:formatCode>General</c:formatCode>
+                <c:ptCount val="8"/>
+                <c:pt idx="0">
+                  <c:v>0</c:v>
+                </c:pt>
+                <c:pt idx="1">
+                  <c:v>1</c:v>
+                </c:pt>
+                <c:pt idx="2">
+                  <c:v>2</c:v>
+                </c:pt>
+                <c:pt idx="3">
+                  <c:v>3</c:v>
+                </c:pt>
+                <c:pt idx="4">
+                  <c:v>4</c:v>
+                </c:pt>
+                <c:pt idx="5">
+                  <c:v>5</c:v>
+                </c:pt>
+                <c:pt idx="6">
+                  <c:v>6</c:v>
+                </c:pt>
+                <c:pt idx="7">
+                  <c:v>7</c:v>
+                </c:pt>
+              </c:numCache>
+            </c:numRef>
+          </c:cat>
+          <c:val>
+            <c:numRef>
+              <c:f>Sheet1!$O$13:$O$20</c:f>
+              <c:numCache>
+                <c:formatCode>General</c:formatCode>
+                <c:ptCount val="8"/>
+                <c:pt idx="0">
+                  <c:v>15</c:v>
+                </c:pt>
+                <c:pt idx="1">
+                  <c:v>7</c:v>
+                </c:pt>
+                <c:pt idx="2">
+                  <c:v>7</c:v>
+                </c:pt>
+                <c:pt idx="3">
+                  <c:v>7</c:v>
+                </c:pt>
+                <c:pt idx="4">
+                  <c:v>7</c:v>
+                </c:pt>
+                <c:pt idx="5">
+                  <c:v>7</c:v>
+                </c:pt>
+                <c:pt idx="6">
+                  <c:v>7</c:v>
+                </c:pt>
+                <c:pt idx="7">
+                  <c:v>7</c:v>
+                </c:pt>
+              </c:numCache>
+            </c:numRef>
+          </c:val>
+        </c:ser>
+        <c:dLbls>
+          <c:showLegendKey val="0"/>
+          <c:showVal val="0"/>
+          <c:showCatName val="0"/>
+          <c:showSerName val="0"/>
+          <c:showPercent val="0"/>
+          <c:showBubbleSize val="0"/>
+        </c:dLbls>
+        <c:gapWidth val="100"/>
+        <c:overlap val="-24"/>
+        <c:axId val="249785520"/>
+        <c:axId val="249792048"/>
+      </c:barChart>
+      <c:catAx>
+        <c:axId val="249785520"/>
+        <c:scaling>
+          <c:orientation val="minMax"/>
+        </c:scaling>
+        <c:delete val="1"/>
+        <c:axPos val="b"/>
+        <c:numFmt formatCode="General" sourceLinked="1"/>
+        <c:majorTickMark val="none"/>
+        <c:minorTickMark val="none"/>
+        <c:tickLblPos val="nextTo"/>
+        <c:crossAx val="249792048"/>
+        <c:crosses val="autoZero"/>
+        <c:auto val="1"/>
+        <c:lblAlgn val="ctr"/>
+        <c:lblOffset val="100"/>
+        <c:noMultiLvlLbl val="0"/>
+      </c:catAx>
+      <c:valAx>
+        <c:axId val="249792048"/>
+        <c:scaling>
+          <c:orientation val="minMax"/>
+        </c:scaling>
+        <c:delete val="1"/>
+        <c:axPos val="l"/>
+        <c:numFmt formatCode="General" sourceLinked="1"/>
+        <c:majorTickMark val="none"/>
+        <c:minorTickMark val="none"/>
+        <c:tickLblPos val="nextTo"/>
+        <c:crossAx val="249785520"/>
+        <c:crosses val="autoZero"/>
+        <c:crossBetween val="between"/>
+      </c:valAx>
+      <c:dTable>
+        <c:showHorzBorder val="1"/>
+        <c:showVertBorder val="1"/>
+        <c:showOutline val="1"/>
+        <c:showKeys val="1"/>
+        <c:spPr>
+          <a:noFill/>
+          <a:ln w="9525" cap="flat" cmpd="sng" algn="ctr">
+            <a:solidFill>
+              <a:schemeClr val="tx1">
+                <a:lumMod val="15000"/>
+                <a:lumOff val="85000"/>
+              </a:schemeClr>
+            </a:solidFill>
+            <a:round/>
+          </a:ln>
+          <a:effectLst/>
+        </c:spPr>
+        <c:txPr>
+          <a:bodyPr rot="0" spcFirstLastPara="1" vertOverflow="ellipsis" vert="horz" wrap="square" anchor="ctr" anchorCtr="1"/>
+          <a:lstStyle/>
+          <a:p>
+            <a:pPr rtl="0">
+              <a:defRPr sz="900" b="0" i="0" u="none" strike="noStrike" kern="1200" baseline="0">
+                <a:solidFill>
+                  <a:schemeClr val="tx1">
+                    <a:lumMod val="65000"/>
+                    <a:lumOff val="35000"/>
+                  </a:schemeClr>
+                </a:solidFill>
+                <a:latin typeface="+mn-lt"/>
+                <a:ea typeface="+mn-ea"/>
+                <a:cs typeface="+mn-cs"/>
+              </a:defRPr>
+            </a:pPr>
+            <a:endParaRPr lang="en-US"/>
+          </a:p>
+        </c:txPr>
+      </c:dTable>
+      <c:spPr>
+        <a:noFill/>
+        <a:ln>
+          <a:noFill/>
+        </a:ln>
+        <a:effectLst/>
+      </c:spPr>
+    </c:plotArea>
+    <c:plotVisOnly val="1"/>
+    <c:dispBlanksAs val="gap"/>
+    <c:showDLblsOverMax val="0"/>
+  </c:chart>
+  <c:spPr>
+    <a:noFill/>
+    <a:ln>
+      <a:noFill/>
+    </a:ln>
+    <a:effectLst/>
+  </c:spPr>
+  <c:txPr>
+    <a:bodyPr/>
+    <a:lstStyle/>
+    <a:p>
+      <a:pPr>
+        <a:defRPr/>
+      </a:pPr>
+      <a:endParaRPr lang="en-US"/>
+    </a:p>
+  </c:txPr>
+  <c:externalData r:id="rId4">
+    <c:autoUpdate val="0"/>
+  </c:externalData>
+</c:chartSpace>
+</file>
+
+<file path=ppt/charts/colors1.xml><?xml version="1.0" encoding="utf-8"?>
+<cs:colorStyle xmlns:cs="http://schemas.microsoft.com/office/drawing/2012/chartStyle" xmlns:a="http://schemas.openxmlformats.org/drawingml/2006/main" meth="withinLinear" id="18">
+  <a:schemeClr val="accent5"/>
+</cs:colorStyle>
+</file>
+
+<file path=ppt/charts/style1.xml><?xml version="1.0" encoding="utf-8"?>
+<cs:chartStyle xmlns:cs="http://schemas.microsoft.com/office/drawing/2012/chartStyle" xmlns:a="http://schemas.openxmlformats.org/drawingml/2006/main" id="340">
+  <cs:axisTitle>
+    <cs:lnRef idx="0"/>
+    <cs:fillRef idx="0"/>
+    <cs:effectRef idx="0"/>
+    <cs:fontRef idx="minor">
+      <a:schemeClr val="tx1">
+        <a:lumMod val="65000"/>
+        <a:lumOff val="35000"/>
+      </a:schemeClr>
+    </cs:fontRef>
+    <cs:defRPr sz="900" kern="1200"/>
+  </cs:axisTitle>
+  <cs:categoryAxis>
+    <cs:lnRef idx="0"/>
+    <cs:fillRef idx="0"/>
+    <cs:effectRef idx="0"/>
+    <cs:fontRef idx="minor">
+      <a:schemeClr val="tx1">
+        <a:lumMod val="65000"/>
+        <a:lumOff val="35000"/>
+      </a:schemeClr>
+    </cs:fontRef>
+    <cs:spPr>
+      <a:ln w="12700" cap="flat" cmpd="sng" algn="ctr">
+        <a:solidFill>
+          <a:schemeClr val="tx1">
+            <a:lumMod val="15000"/>
+            <a:lumOff val="85000"/>
+          </a:schemeClr>
+        </a:solidFill>
+        <a:round/>
+      </a:ln>
+    </cs:spPr>
+    <cs:defRPr sz="900" kern="1200"/>
+  </cs:categoryAxis>
+  <cs:chartArea mods="allowNoFillOverride allowNoLineOverride">
+    <cs:lnRef idx="0"/>
+    <cs:fillRef idx="0"/>
+    <cs:effectRef idx="0"/>
+    <cs:fontRef idx="minor">
+      <a:schemeClr val="tx2"/>
+    </cs:fontRef>
+    <cs:spPr>
+      <a:solidFill>
+        <a:schemeClr val="bg1"/>
+      </a:solidFill>
+      <a:ln w="9525" cap="flat" cmpd="sng" algn="ctr">
+        <a:solidFill>
+          <a:schemeClr val="tx1">
+            <a:lumMod val="15000"/>
+            <a:lumOff val="85000"/>
+          </a:schemeClr>
+        </a:solidFill>
+        <a:round/>
+      </a:ln>
+    </cs:spPr>
+    <cs:defRPr sz="900" kern="1200"/>
+  </cs:chartArea>
+  <cs:dataLabel>
+    <cs:lnRef idx="0"/>
+    <cs:fillRef idx="0"/>
+    <cs:effectRef idx="0"/>
+    <cs:fontRef idx="minor">
+      <a:schemeClr val="tx1">
+        <a:lumMod val="75000"/>
+        <a:lumOff val="25000"/>
+      </a:schemeClr>
+    </cs:fontRef>
+    <cs:defRPr sz="900" kern="1200"/>
+  </cs:dataLabel>
+  <cs:dataLabelCallout>
+    <cs:lnRef idx="0"/>
+    <cs:fillRef idx="0"/>
+    <cs:effectRef idx="0"/>
+    <cs:fontRef idx="minor">
+      <a:schemeClr val="dk1">
+        <a:lumMod val="65000"/>
+        <a:lumOff val="35000"/>
+      </a:schemeClr>
+    </cs:fontRef>
+    <cs:spPr>
+      <a:solidFill>
+        <a:schemeClr val="lt1"/>
+      </a:solidFill>
+      <a:ln>
+        <a:solidFill>
+          <a:schemeClr val="dk1">
+            <a:lumMod val="25000"/>
+            <a:lumOff val="75000"/>
+          </a:schemeClr>
+        </a:solidFill>
+      </a:ln>
+    </cs:spPr>
+    <cs:defRPr sz="900" kern="1200"/>
+    <cs:bodyPr rot="0" spcFirstLastPara="1" vertOverflow="clip" horzOverflow="clip" vert="horz" wrap="square" lIns="36576" tIns="18288" rIns="36576" bIns="18288" anchor="ctr" anchorCtr="1">
+      <a:spAutoFit/>
+    </cs:bodyPr>
+  </cs:dataLabelCallout>
+  <cs:dataPoint>
+    <cs:lnRef idx="0"/>
+    <cs:fillRef idx="3">
+      <cs:styleClr val="auto"/>
+    </cs:fillRef>
+    <cs:effectRef idx="3"/>
+    <cs:fontRef idx="minor">
+      <a:schemeClr val="lt1"/>
+    </cs:fontRef>
+  </cs:dataPoint>
+  <cs:dataPoint3D>
+    <cs:lnRef idx="0"/>
+    <cs:fillRef idx="3">
+      <cs:styleClr val="auto"/>
+    </cs:fillRef>
+    <cs:effectRef idx="3"/>
+    <cs:fontRef idx="minor">
+      <a:schemeClr val="lt1"/>
+    </cs:fontRef>
+  </cs:dataPoint3D>
+  <cs:dataPointLine>
+    <cs:lnRef idx="0">
+      <cs:styleClr val="auto"/>
+    </cs:lnRef>
+    <cs:fillRef idx="3"/>
+    <cs:effectRef idx="3"/>
+    <cs:fontRef idx="minor">
+      <a:schemeClr val="lt1"/>
+    </cs:fontRef>
+    <cs:spPr>
+      <a:ln w="34925" cap="rnd">
+        <a:solidFill>
+          <a:schemeClr val="phClr"/>
+        </a:solidFill>
+        <a:round/>
+      </a:ln>
+    </cs:spPr>
+  </cs:dataPointLine>
+  <cs:dataPointMarker>
+    <cs:lnRef idx="0">
+      <cs:styleClr val="auto"/>
+    </cs:lnRef>
+    <cs:fillRef idx="3">
+      <cs:styleClr val="auto"/>
+    </cs:fillRef>
+    <cs:effectRef idx="3"/>
+    <cs:fontRef idx="minor">
+      <a:schemeClr val="lt1"/>
+    </cs:fontRef>
+    <cs:spPr>
+      <a:ln w="9525">
+        <a:solidFill>
+          <a:schemeClr val="phClr"/>
+        </a:solidFill>
+        <a:round/>
+      </a:ln>
+    </cs:spPr>
+  </cs:dataPointMarker>
+  <cs:dataPointMarkerLayout symbol="circle" size="6"/>
+  <cs:dataPointWireframe>
+    <cs:lnRef idx="0">
+      <cs:styleClr val="auto"/>
+    </cs:lnRef>
+    <cs:fillRef idx="3"/>
+    <cs:effectRef idx="3"/>
+    <cs:fontRef idx="minor">
+      <a:schemeClr val="lt1"/>
+    </cs:fontRef>
+    <cs:spPr>
+      <a:ln w="9525" cap="rnd">
+        <a:solidFill>
+          <a:schemeClr val="phClr"/>
+        </a:solidFill>
+        <a:round/>
+      </a:ln>
+    </cs:spPr>
+  </cs:dataPointWireframe>
+  <cs:dataTable>
+    <cs:lnRef idx="0"/>
+    <cs:fillRef idx="0"/>
+    <cs:effectRef idx="0"/>
+    <cs:fontRef idx="minor">
+      <a:schemeClr val="tx1">
+        <a:lumMod val="65000"/>
+        <a:lumOff val="35000"/>
+      </a:schemeClr>
+    </cs:fontRef>
+    <cs:spPr>
+      <a:noFill/>
+      <a:ln w="9525" cap="flat" cmpd="sng" algn="ctr">
+        <a:solidFill>
+          <a:schemeClr val="tx1">
+            <a:lumMod val="15000"/>
+            <a:lumOff val="85000"/>
+          </a:schemeClr>
+        </a:solidFill>
+        <a:round/>
+      </a:ln>
+    </cs:spPr>
+    <cs:defRPr sz="900" kern="1200"/>
+  </cs:dataTable>
+  <cs:downBar>
+    <cs:lnRef idx="0"/>
+    <cs:fillRef idx="0"/>
+    <cs:effectRef idx="0"/>
+    <cs:fontRef idx="minor">
+      <a:schemeClr val="dk1"/>
+    </cs:fontRef>
+    <cs:spPr>
+      <a:solidFill>
+        <a:schemeClr val="dk1">
+          <a:lumMod val="65000"/>
+          <a:lumOff val="35000"/>
+        </a:schemeClr>
+      </a:solidFill>
+      <a:ln w="9525">
+        <a:solidFill>
+          <a:schemeClr val="tx1">
+            <a:lumMod val="65000"/>
+            <a:lumOff val="35000"/>
+          </a:schemeClr>
+        </a:solidFill>
+      </a:ln>
+    </cs:spPr>
+  </cs:downBar>
+  <cs:dropLine>
+    <cs:lnRef idx="0"/>
+    <cs:fillRef idx="0"/>
+    <cs:effectRef idx="0"/>
+    <cs:fontRef idx="minor">
+      <a:schemeClr val="tx1"/>
+    </cs:fontRef>
+    <cs:spPr>
+      <a:ln w="9525" cap="flat" cmpd="sng" algn="ctr">
+        <a:solidFill>
+          <a:schemeClr val="tx1">
+            <a:lumMod val="35000"/>
+            <a:lumOff val="65000"/>
+          </a:schemeClr>
+        </a:solidFill>
+        <a:round/>
+      </a:ln>
+    </cs:spPr>
+  </cs:dropLine>
+  <cs:errorBar>
+    <cs:lnRef idx="0"/>
+    <cs:fillRef idx="0"/>
+    <cs:effectRef idx="0"/>
+    <cs:fontRef idx="minor">
+      <a:schemeClr val="tx1"/>
+    </cs:fontRef>
+    <cs:spPr>
+      <a:ln w="9525" cap="flat" cmpd="sng" algn="ctr">
+        <a:solidFill>
+          <a:schemeClr val="tx1">
+            <a:lumMod val="65000"/>
+            <a:lumOff val="35000"/>
+          </a:schemeClr>
+        </a:solidFill>
+        <a:round/>
+      </a:ln>
+    </cs:spPr>
+  </cs:errorBar>
+  <cs:floor>
+    <cs:lnRef idx="0"/>
+    <cs:fillRef idx="0"/>
+    <cs:effectRef idx="0"/>
+    <cs:fontRef idx="minor">
+      <a:schemeClr val="lt1"/>
+    </cs:fontRef>
+  </cs:floor>
+  <cs:gridlineMajor>
+    <cs:lnRef idx="0"/>
+    <cs:fillRef idx="0"/>
+    <cs:effectRef idx="0"/>
+    <cs:fontRef idx="minor">
+      <a:schemeClr val="tx1"/>
+    </cs:fontRef>
+    <cs:spPr>
+      <a:ln w="9525" cap="flat" cmpd="sng" algn="ctr">
+        <a:solidFill>
+          <a:schemeClr val="tx1">
+            <a:lumMod val="15000"/>
+            <a:lumOff val="85000"/>
+          </a:schemeClr>
+        </a:solidFill>
+        <a:round/>
+      </a:ln>
+    </cs:spPr>
+  </cs:gridlineMajor>
+  <cs:gridlineMinor>
+    <cs:lnRef idx="0"/>
+    <cs:fillRef idx="0"/>
+    <cs:effectRef idx="0"/>
+    <cs:fontRef idx="minor">
+      <a:schemeClr val="tx1"/>
+    </cs:fontRef>
+    <cs:spPr>
+      <a:ln w="9525" cap="flat" cmpd="sng" algn="ctr">
+        <a:solidFill>
+          <a:schemeClr val="tx1">
+            <a:lumMod val="5000"/>
+            <a:lumOff val="95000"/>
+          </a:schemeClr>
+        </a:solidFill>
+        <a:round/>
+      </a:ln>
+    </cs:spPr>
+  </cs:gridlineMinor>
+  <cs:hiLoLine>
+    <cs:lnRef idx="0"/>
+    <cs:fillRef idx="0"/>
+    <cs:effectRef idx="0"/>
+    <cs:fontRef idx="minor">
+      <a:schemeClr val="tx1"/>
+    </cs:fontRef>
+    <cs:spPr>
+      <a:ln w="9525" cap="flat" cmpd="sng" algn="ctr">
+        <a:solidFill>
+          <a:schemeClr val="tx1">
+            <a:lumMod val="75000"/>
+            <a:lumOff val="25000"/>
+          </a:schemeClr>
+        </a:solidFill>
+        <a:round/>
+      </a:ln>
+    </cs:spPr>
+  </cs:hiLoLine>
+  <cs:leaderLine>
+    <cs:lnRef idx="0"/>
+    <cs:fillRef idx="0"/>
+    <cs:effectRef idx="0"/>
+    <cs:fontRef idx="minor">
+      <a:schemeClr val="tx1"/>
+    </cs:fontRef>
+    <cs:spPr>
+      <a:ln w="9525" cap="flat" cmpd="sng" algn="ctr">
+        <a:solidFill>
+          <a:schemeClr val="tx1">
+            <a:lumMod val="35000"/>
+            <a:lumOff val="65000"/>
+          </a:schemeClr>
+        </a:solidFill>
+        <a:round/>
+      </a:ln>
+    </cs:spPr>
+  </cs:leaderLine>
+  <cs:legend>
+    <cs:lnRef idx="0"/>
+    <cs:fillRef idx="0"/>
+    <cs:effectRef idx="0"/>
+    <cs:fontRef idx="minor">
+      <a:schemeClr val="tx1">
+        <a:lumMod val="65000"/>
+        <a:lumOff val="35000"/>
+      </a:schemeClr>
+    </cs:fontRef>
+    <cs:defRPr sz="900" kern="1200"/>
+  </cs:legend>
+  <cs:plotArea>
+    <cs:lnRef idx="0"/>
+    <cs:fillRef idx="0"/>
+    <cs:effectRef idx="0"/>
+    <cs:fontRef idx="minor">
+      <a:schemeClr val="lt1"/>
+    </cs:fontRef>
+  </cs:plotArea>
+  <cs:plotArea3D>
+    <cs:lnRef idx="0"/>
+    <cs:fillRef idx="0"/>
+    <cs:effectRef idx="0"/>
+    <cs:fontRef idx="minor">
+      <a:schemeClr val="lt1"/>
+    </cs:fontRef>
+  </cs:plotArea3D>
+  <cs:seriesAxis>
+    <cs:lnRef idx="0"/>
+    <cs:fillRef idx="0"/>
+    <cs:effectRef idx="0"/>
+    <cs:fontRef idx="minor">
+      <a:schemeClr val="tx1">
+        <a:lumMod val="65000"/>
+        <a:lumOff val="35000"/>
+      </a:schemeClr>
+    </cs:fontRef>
+    <cs:spPr>
+      <a:ln w="12700" cap="flat" cmpd="sng" algn="ctr">
+        <a:solidFill>
+          <a:schemeClr val="tx1">
+            <a:lumMod val="15000"/>
+            <a:lumOff val="85000"/>
+          </a:schemeClr>
+        </a:solidFill>
+        <a:round/>
+      </a:ln>
+    </cs:spPr>
+    <cs:defRPr sz="900" kern="1200"/>
+  </cs:seriesAxis>
+  <cs:seriesLine>
+    <cs:lnRef idx="0"/>
+    <cs:fillRef idx="0"/>
+    <cs:effectRef idx="0"/>
+    <cs:fontRef idx="minor">
+      <a:schemeClr val="tx1"/>
+    </cs:fontRef>
+    <cs:spPr>
+      <a:ln w="9525" cap="flat" cmpd="sng" algn="ctr">
+        <a:solidFill>
+          <a:schemeClr val="tx1">
+            <a:lumMod val="35000"/>
+            <a:lumOff val="65000"/>
+          </a:schemeClr>
+        </a:solidFill>
+        <a:round/>
+      </a:ln>
+    </cs:spPr>
+  </cs:seriesLine>
+  <cs:title>
+    <cs:lnRef idx="0"/>
+    <cs:fillRef idx="0"/>
+    <cs:effectRef idx="0"/>
+    <cs:fontRef idx="minor">
+      <a:schemeClr val="tx1">
+        <a:lumMod val="65000"/>
+        <a:lumOff val="35000"/>
+      </a:schemeClr>
+    </cs:fontRef>
+    <cs:defRPr sz="1600" b="1" kern="1200" baseline="0"/>
+  </cs:title>
+  <cs:trendline>
+    <cs:lnRef idx="0">
+      <cs:styleClr val="auto"/>
+    </cs:lnRef>
+    <cs:fillRef idx="0"/>
+    <cs:effectRef idx="0"/>
+    <cs:fontRef idx="minor">
+      <a:schemeClr val="lt1"/>
+    </cs:fontRef>
+    <cs:spPr>
+      <a:ln w="19050" cap="rnd">
+        <a:solidFill>
+          <a:schemeClr val="phClr"/>
+        </a:solidFill>
+      </a:ln>
+    </cs:spPr>
+  </cs:trendline>
+  <cs:trendlineLabel>
+    <cs:lnRef idx="0"/>
+    <cs:fillRef idx="0"/>
+    <cs:effectRef idx="0"/>
+    <cs:fontRef idx="minor">
+      <a:schemeClr val="tx1">
+        <a:lumMod val="65000"/>
+        <a:lumOff val="35000"/>
+      </a:schemeClr>
+    </cs:fontRef>
+    <cs:defRPr sz="900" kern="1200"/>
+  </cs:trendlineLabel>
+  <cs:upBar>
+    <cs:lnRef idx="0"/>
+    <cs:fillRef idx="0"/>
+    <cs:effectRef idx="0"/>
+    <cs:fontRef idx="minor">
+      <a:schemeClr val="dk1"/>
+    </cs:fontRef>
+    <cs:spPr>
+      <a:solidFill>
+        <a:schemeClr val="lt1"/>
+      </a:solidFill>
+      <a:ln w="9525">
+        <a:solidFill>
+          <a:schemeClr val="tx1">
+            <a:lumMod val="15000"/>
+            <a:lumOff val="85000"/>
+          </a:schemeClr>
+        </a:solidFill>
+      </a:ln>
+    </cs:spPr>
+  </cs:upBar>
+  <cs:valueAxis>
+    <cs:lnRef idx="0"/>
+    <cs:fillRef idx="0"/>
+    <cs:effectRef idx="0"/>
+    <cs:fontRef idx="minor">
+      <a:schemeClr val="tx1">
+        <a:lumMod val="65000"/>
+        <a:lumOff val="35000"/>
+      </a:schemeClr>
+    </cs:fontRef>
+    <cs:defRPr sz="900" kern="1200"/>
+  </cs:valueAxis>
+  <cs:wall>
+    <cs:lnRef idx="0"/>
+    <cs:fillRef idx="0"/>
+    <cs:effectRef idx="0"/>
+    <cs:fontRef idx="minor">
+      <a:schemeClr val="lt1"/>
+    </cs:fontRef>
+  </cs:wall>
+</cs:chartStyle>
 </file>
 
 <file path=ppt/handoutMasters/handoutMaster1.xml><?xml version="1.0" encoding="utf-8"?>
@@ -4392,6 +5163,111 @@
 </p:sld>
 </file>
 
+<file path=ppt/slides/slide10.xml><?xml version="1.0" encoding="utf-8"?>
+<p:sld xmlns:a="http://schemas.openxmlformats.org/drawingml/2006/main" xmlns:r="http://schemas.openxmlformats.org/officeDocument/2006/relationships" xmlns:p="http://schemas.openxmlformats.org/presentationml/2006/main">
+  <p:cSld>
+    <p:spTree>
+      <p:nvGrpSpPr>
+        <p:cNvPr id="1" name=""/>
+        <p:cNvGrpSpPr/>
+        <p:nvPr/>
+      </p:nvGrpSpPr>
+      <p:grpSpPr>
+        <a:xfrm>
+          <a:off x="0" y="0"/>
+          <a:ext cx="0" cy="0"/>
+          <a:chOff x="0" y="0"/>
+          <a:chExt cx="0" cy="0"/>
+        </a:xfrm>
+      </p:grpSpPr>
+      <p:sp>
+        <p:nvSpPr>
+          <p:cNvPr id="2" name="Title 1"/>
+          <p:cNvSpPr>
+            <a:spLocks noGrp="1"/>
+          </p:cNvSpPr>
+          <p:nvPr>
+            <p:ph type="title"/>
+          </p:nvPr>
+        </p:nvSpPr>
+        <p:spPr/>
+        <p:txBody>
+          <a:bodyPr/>
+          <a:lstStyle/>
+          <a:p>
+            <a:r>
+              <a:rPr lang="de-DE" dirty="0" smtClean="0"/>
+              <a:t>Ende</a:t>
+            </a:r>
+            <a:endParaRPr lang="en-US" dirty="0"/>
+          </a:p>
+        </p:txBody>
+      </p:sp>
+      <p:sp>
+        <p:nvSpPr>
+          <p:cNvPr id="3" name="Content Placeholder 2"/>
+          <p:cNvSpPr>
+            <a:spLocks noGrp="1"/>
+          </p:cNvSpPr>
+          <p:nvPr>
+            <p:ph idx="1"/>
+          </p:nvPr>
+        </p:nvSpPr>
+        <p:spPr>
+          <a:xfrm>
+            <a:off x="360000" y="1620000"/>
+            <a:ext cx="8388464" cy="4479943"/>
+          </a:xfrm>
+        </p:spPr>
+        <p:txBody>
+          <a:bodyPr/>
+          <a:lstStyle/>
+          <a:p>
+            <a:pPr algn="ctr"/>
+            <a:endParaRPr lang="de-DE" dirty="0" smtClean="0"/>
+          </a:p>
+          <a:p>
+            <a:pPr algn="ctr"/>
+            <a:endParaRPr lang="de-DE" dirty="0"/>
+          </a:p>
+          <a:p>
+            <a:pPr algn="ctr"/>
+            <a:endParaRPr lang="de-DE" dirty="0" smtClean="0"/>
+          </a:p>
+          <a:p>
+            <a:pPr algn="ctr"/>
+            <a:endParaRPr lang="de-DE" dirty="0"/>
+          </a:p>
+          <a:p>
+            <a:pPr algn="ctr"/>
+            <a:r>
+              <a:rPr lang="de-DE" sz="3200" dirty="0" smtClean="0"/>
+              <a:t>Danke für Ihre Aufmerksamkeit</a:t>
+            </a:r>
+            <a:endParaRPr lang="en-US" sz="3200" dirty="0"/>
+          </a:p>
+        </p:txBody>
+      </p:sp>
+    </p:spTree>
+    <p:extLst>
+      <p:ext uri="{BB962C8B-B14F-4D97-AF65-F5344CB8AC3E}">
+        <p14:creationId xmlns:p14="http://schemas.microsoft.com/office/powerpoint/2010/main" val="2271465397"/>
+      </p:ext>
+    </p:extLst>
+  </p:cSld>
+  <p:clrMapOvr>
+    <a:masterClrMapping/>
+  </p:clrMapOvr>
+  <p:timing>
+    <p:tnLst>
+      <p:par>
+        <p:cTn id="1" dur="indefinite" restart="never" nodeType="tmRoot"/>
+      </p:par>
+    </p:tnLst>
+  </p:timing>
+</p:sld>
+</file>
+
 <file path=ppt/slides/slide2.xml><?xml version="1.0" encoding="utf-8"?>
 <p:sld xmlns:a="http://schemas.openxmlformats.org/drawingml/2006/main" xmlns:r="http://schemas.openxmlformats.org/officeDocument/2006/relationships" xmlns:p="http://schemas.openxmlformats.org/presentationml/2006/main">
   <p:cSld>
@@ -4619,12 +5495,12 @@
           <a:graphicData uri="http://schemas.openxmlformats.org/presentationml/2006/ole">
             <mc:AlternateContent xmlns:mc="http://schemas.openxmlformats.org/markup-compatibility/2006">
               <mc:Choice xmlns:v="urn:schemas-microsoft-com:vml" Requires="v">
-                <p:oleObj spid="_x0000_s1031" name="Worksheet" r:id="rId4" imgW="2857451" imgH="1409758" progId="Excel.Sheet.12">
+                <p:oleObj spid="_x0000_s1037" name="Worksheet" r:id="rId3" imgW="2857451" imgH="1409758" progId="Excel.Sheet.12">
                   <p:embed/>
                 </p:oleObj>
               </mc:Choice>
               <mc:Fallback>
-                <p:oleObj name="Worksheet" r:id="rId4" imgW="2857451" imgH="1409758" progId="Excel.Sheet.12">
+                <p:oleObj name="Worksheet" r:id="rId3" imgW="2857451" imgH="1409758" progId="Excel.Sheet.12">
                   <p:embed/>
                   <p:pic>
                     <p:nvPicPr>
@@ -4633,7 +5509,7 @@
                       <p:nvPr/>
                     </p:nvPicPr>
                     <p:blipFill>
-                      <a:blip r:embed="rId5"/>
+                      <a:blip r:embed="rId4"/>
                       <a:stretch>
                         <a:fillRect/>
                       </a:stretch>
@@ -4736,12 +5612,12 @@
           <a:graphicData uri="http://schemas.openxmlformats.org/presentationml/2006/ole">
             <mc:AlternateContent xmlns:mc="http://schemas.openxmlformats.org/markup-compatibility/2006">
               <mc:Choice xmlns:v="urn:schemas-microsoft-com:vml" Requires="v">
-                <p:oleObj spid="_x0000_s2054" name="Worksheet" r:id="rId4" imgW="2857451" imgH="1409758" progId="Excel.Sheet.12">
+                <p:oleObj spid="_x0000_s2060" name="Worksheet" r:id="rId3" imgW="2857451" imgH="1409758" progId="Excel.Sheet.12">
                   <p:embed/>
                 </p:oleObj>
               </mc:Choice>
               <mc:Fallback>
-                <p:oleObj name="Worksheet" r:id="rId4" imgW="2857451" imgH="1409758" progId="Excel.Sheet.12">
+                <p:oleObj name="Worksheet" r:id="rId3" imgW="2857451" imgH="1409758" progId="Excel.Sheet.12">
                   <p:embed/>
                   <p:pic>
                     <p:nvPicPr>
@@ -4750,7 +5626,7 @@
                       <p:nvPr/>
                     </p:nvPicPr>
                     <p:blipFill>
-                      <a:blip r:embed="rId5"/>
+                      <a:blip r:embed="rId4"/>
                       <a:stretch>
                         <a:fillRect/>
                       </a:stretch>
@@ -4853,12 +5729,12 @@
           <a:graphicData uri="http://schemas.openxmlformats.org/presentationml/2006/ole">
             <mc:AlternateContent xmlns:mc="http://schemas.openxmlformats.org/markup-compatibility/2006">
               <mc:Choice xmlns:v="urn:schemas-microsoft-com:vml" Requires="v">
-                <p:oleObj spid="_x0000_s3076" name="Worksheet" r:id="rId4" imgW="2857451" imgH="1409758" progId="Excel.Sheet.12">
+                <p:oleObj spid="_x0000_s3082" name="Worksheet" r:id="rId3" imgW="2857451" imgH="1409758" progId="Excel.Sheet.12">
                   <p:embed/>
                 </p:oleObj>
               </mc:Choice>
               <mc:Fallback>
-                <p:oleObj name="Worksheet" r:id="rId4" imgW="2857451" imgH="1409758" progId="Excel.Sheet.12">
+                <p:oleObj name="Worksheet" r:id="rId3" imgW="2857451" imgH="1409758" progId="Excel.Sheet.12">
                   <p:embed/>
                   <p:pic>
                     <p:nvPicPr>
@@ -4867,7 +5743,7 @@
                       <p:nvPr/>
                     </p:nvPicPr>
                     <p:blipFill>
-                      <a:blip r:embed="rId5"/>
+                      <a:blip r:embed="rId4"/>
                       <a:stretch>
                         <a:fillRect/>
                       </a:stretch>
@@ -4935,35 +5811,77 @@
           <a:p>
             <a:r>
               <a:rPr lang="de-DE" dirty="0" smtClean="0"/>
-              <a:t>Aufgabe 4: Histogramme</a:t>
+              <a:t>Aufgabe 4: </a:t>
+            </a:r>
+            <a:r>
+              <a:rPr lang="de-DE" dirty="0" smtClean="0"/>
+              <a:t>Histogramme</a:t>
             </a:r>
             <a:endParaRPr lang="en-US" dirty="0"/>
           </a:p>
         </p:txBody>
       </p:sp>
-      <p:sp>
-        <p:nvSpPr>
-          <p:cNvPr id="3" name="Content Placeholder 2"/>
-          <p:cNvSpPr>
-            <a:spLocks noGrp="1"/>
-          </p:cNvSpPr>
+      <p:graphicFrame>
+        <p:nvGraphicFramePr>
+          <p:cNvPr id="4" name="Object 3"/>
+          <p:cNvGraphicFramePr>
+            <a:graphicFrameLocks noChangeAspect="1"/>
+          </p:cNvGraphicFramePr>
           <p:nvPr>
-            <p:ph idx="1"/>
+            <p:extLst>
+              <p:ext uri="{D42A27DB-BD31-4B8C-83A1-F6EECF244321}">
+                <p14:modId xmlns:p14="http://schemas.microsoft.com/office/powerpoint/2010/main" val="1353301031"/>
+              </p:ext>
+            </p:extLst>
           </p:nvPr>
-        </p:nvSpPr>
-        <p:spPr/>
-        <p:txBody>
-          <a:bodyPr/>
-          <a:lstStyle/>
-          <a:p>
-            <a:endParaRPr lang="en-US"/>
-          </a:p>
-        </p:txBody>
-      </p:sp>
+        </p:nvGraphicFramePr>
+        <p:xfrm>
+          <a:off x="2267744" y="1811356"/>
+          <a:ext cx="4608512" cy="4209932"/>
+        </p:xfrm>
+        <a:graphic>
+          <a:graphicData uri="http://schemas.openxmlformats.org/presentationml/2006/ole">
+            <mc:AlternateContent xmlns:mc="http://schemas.openxmlformats.org/markup-compatibility/2006">
+              <mc:Choice xmlns:v="urn:schemas-microsoft-com:vml" Requires="v">
+                <p:oleObj spid="_x0000_s4100" name="Worksheet" r:id="rId3" imgW="1762035" imgH="1609609" progId="Excel.Sheet.12">
+                  <p:embed/>
+                </p:oleObj>
+              </mc:Choice>
+              <mc:Fallback>
+                <p:oleObj name="Worksheet" r:id="rId3" imgW="1762035" imgH="1609609" progId="Excel.Sheet.12">
+                  <p:embed/>
+                  <p:pic>
+                    <p:nvPicPr>
+                      <p:cNvPr id="0" name=""/>
+                      <p:cNvPicPr/>
+                      <p:nvPr/>
+                    </p:nvPicPr>
+                    <p:blipFill>
+                      <a:blip r:embed="rId4"/>
+                      <a:stretch>
+                        <a:fillRect/>
+                      </a:stretch>
+                    </p:blipFill>
+                    <p:spPr>
+                      <a:xfrm>
+                        <a:off x="2267744" y="1811356"/>
+                        <a:ext cx="4608512" cy="4209932"/>
+                      </a:xfrm>
+                      <a:prstGeom prst="rect">
+                        <a:avLst/>
+                      </a:prstGeom>
+                    </p:spPr>
+                  </p:pic>
+                </p:oleObj>
+              </mc:Fallback>
+            </mc:AlternateContent>
+          </a:graphicData>
+        </a:graphic>
+      </p:graphicFrame>
     </p:spTree>
     <p:extLst>
       <p:ext uri="{BB962C8B-B14F-4D97-AF65-F5344CB8AC3E}">
-        <p14:creationId xmlns:p14="http://schemas.microsoft.com/office/powerpoint/2010/main" val="2582429254"/>
+        <p14:creationId xmlns:p14="http://schemas.microsoft.com/office/powerpoint/2010/main" val="1747453491"/>
       </p:ext>
     </p:extLst>
   </p:cSld>
@@ -5007,35 +5925,51 @@
           <a:p>
             <a:r>
               <a:rPr lang="de-DE" dirty="0" smtClean="0"/>
-              <a:t>Aufgabe 5: Filter</a:t>
+              <a:t>Aufgabe 4: </a:t>
+            </a:r>
+            <a:r>
+              <a:rPr lang="de-DE" dirty="0" smtClean="0"/>
+              <a:t>Histogramme</a:t>
+            </a:r>
+            <a:br>
+              <a:rPr lang="de-DE" dirty="0" smtClean="0"/>
+            </a:br>
+            <a:r>
+              <a:rPr lang="de-DE" sz="1600" dirty="0" smtClean="0"/>
+              <a:t>Histogramm</a:t>
             </a:r>
             <a:endParaRPr lang="en-US" dirty="0"/>
           </a:p>
         </p:txBody>
       </p:sp>
-      <p:sp>
-        <p:nvSpPr>
-          <p:cNvPr id="3" name="Content Placeholder 2"/>
-          <p:cNvSpPr>
-            <a:spLocks noGrp="1"/>
-          </p:cNvSpPr>
+      <p:graphicFrame>
+        <p:nvGraphicFramePr>
+          <p:cNvPr id="8" name="Chart 7"/>
+          <p:cNvGraphicFramePr>
+            <a:graphicFrameLocks/>
+          </p:cNvGraphicFramePr>
           <p:nvPr>
-            <p:ph idx="1"/>
+            <p:extLst>
+              <p:ext uri="{D42A27DB-BD31-4B8C-83A1-F6EECF244321}">
+                <p14:modId xmlns:p14="http://schemas.microsoft.com/office/powerpoint/2010/main" val="1178811525"/>
+              </p:ext>
+            </p:extLst>
           </p:nvPr>
-        </p:nvSpPr>
-        <p:spPr/>
-        <p:txBody>
-          <a:bodyPr/>
-          <a:lstStyle/>
-          <a:p>
-            <a:endParaRPr lang="en-US"/>
-          </a:p>
-        </p:txBody>
-      </p:sp>
+        </p:nvGraphicFramePr>
+        <p:xfrm>
+          <a:off x="503548" y="1628800"/>
+          <a:ext cx="8136904" cy="4536504"/>
+        </p:xfrm>
+        <a:graphic>
+          <a:graphicData uri="http://schemas.openxmlformats.org/drawingml/2006/chart">
+            <c:chart xmlns:c="http://schemas.openxmlformats.org/drawingml/2006/chart" xmlns:r="http://schemas.openxmlformats.org/officeDocument/2006/relationships" r:id="rId2"/>
+          </a:graphicData>
+        </a:graphic>
+      </p:graphicFrame>
     </p:spTree>
     <p:extLst>
       <p:ext uri="{BB962C8B-B14F-4D97-AF65-F5344CB8AC3E}">
-        <p14:creationId xmlns:p14="http://schemas.microsoft.com/office/powerpoint/2010/main" val="3685300031"/>
+        <p14:creationId xmlns:p14="http://schemas.microsoft.com/office/powerpoint/2010/main" val="2582429254"/>
       </p:ext>
     </p:extLst>
   </p:cSld>
@@ -5079,7 +6013,7 @@
           <a:p>
             <a:r>
               <a:rPr lang="de-DE" dirty="0" smtClean="0"/>
-              <a:t>Ende</a:t>
+              <a:t>Aufgabe 5: Filter</a:t>
             </a:r>
             <a:endParaRPr lang="en-US" dirty="0"/>
           </a:p>
@@ -5095,58 +6029,25 @@
             <p:ph idx="1"/>
           </p:nvPr>
         </p:nvSpPr>
-        <p:spPr>
-          <a:xfrm>
-            <a:off x="360000" y="1620000"/>
-            <a:ext cx="8388464" cy="4479943"/>
-          </a:xfrm>
-        </p:spPr>
+        <p:spPr/>
         <p:txBody>
           <a:bodyPr/>
           <a:lstStyle/>
           <a:p>
-            <a:pPr algn="ctr"/>
-            <a:endParaRPr lang="de-DE" dirty="0" smtClean="0"/>
-          </a:p>
-          <a:p>
-            <a:pPr algn="ctr"/>
-            <a:endParaRPr lang="de-DE" dirty="0"/>
-          </a:p>
-          <a:p>
-            <a:pPr algn="ctr"/>
-            <a:endParaRPr lang="de-DE" dirty="0" smtClean="0"/>
-          </a:p>
-          <a:p>
-            <a:pPr algn="ctr"/>
-            <a:endParaRPr lang="de-DE" dirty="0"/>
-          </a:p>
-          <a:p>
-            <a:pPr algn="ctr"/>
-            <a:r>
-              <a:rPr lang="de-DE" sz="3200" dirty="0" smtClean="0"/>
-              <a:t>Danke für Ihre Aufmerksamkeit</a:t>
-            </a:r>
-            <a:endParaRPr lang="en-US" sz="3200" dirty="0"/>
+            <a:endParaRPr lang="en-US"/>
           </a:p>
         </p:txBody>
       </p:sp>
     </p:spTree>
     <p:extLst>
       <p:ext uri="{BB962C8B-B14F-4D97-AF65-F5344CB8AC3E}">
-        <p14:creationId xmlns:p14="http://schemas.microsoft.com/office/powerpoint/2010/main" val="2271465397"/>
+        <p14:creationId xmlns:p14="http://schemas.microsoft.com/office/powerpoint/2010/main" val="3685300031"/>
       </p:ext>
     </p:extLst>
   </p:cSld>
   <p:clrMapOvr>
     <a:masterClrMapping/>
   </p:clrMapOvr>
-  <p:timing>
-    <p:tnLst>
-      <p:par>
-        <p:cTn id="1" dur="indefinite" restart="never" nodeType="tmRoot"/>
-      </p:par>
-    </p:tnLst>
-  </p:timing>
 </p:sld>
 </file>
 
@@ -6432,4 +7333,256 @@
   <a:objectDefaults/>
   <a:extraClrSchemeLst/>
 </a:theme>
+</file>
+
+<file path=ppt/theme/themeOverride1.xml><?xml version="1.0" encoding="utf-8"?>
+<a:themeOverride xmlns:a="http://schemas.openxmlformats.org/drawingml/2006/main">
+  <a:clrScheme name="Office">
+    <a:dk1>
+      <a:sysClr val="windowText" lastClr="000000"/>
+    </a:dk1>
+    <a:lt1>
+      <a:sysClr val="window" lastClr="FFFFFF"/>
+    </a:lt1>
+    <a:dk2>
+      <a:srgbClr val="44546A"/>
+    </a:dk2>
+    <a:lt2>
+      <a:srgbClr val="E7E6E6"/>
+    </a:lt2>
+    <a:accent1>
+      <a:srgbClr val="5B9BD5"/>
+    </a:accent1>
+    <a:accent2>
+      <a:srgbClr val="ED7D31"/>
+    </a:accent2>
+    <a:accent3>
+      <a:srgbClr val="A5A5A5"/>
+    </a:accent3>
+    <a:accent4>
+      <a:srgbClr val="FFC000"/>
+    </a:accent4>
+    <a:accent5>
+      <a:srgbClr val="4472C4"/>
+    </a:accent5>
+    <a:accent6>
+      <a:srgbClr val="70AD47"/>
+    </a:accent6>
+    <a:hlink>
+      <a:srgbClr val="0563C1"/>
+    </a:hlink>
+    <a:folHlink>
+      <a:srgbClr val="954F72"/>
+    </a:folHlink>
+  </a:clrScheme>
+  <a:fontScheme name="Office">
+    <a:majorFont>
+      <a:latin typeface="Calibri Light" panose="020F0302020204030204"/>
+      <a:ea typeface=""/>
+      <a:cs typeface=""/>
+      <a:font script="Jpan" typeface="ＭＳ Ｐゴシック"/>
+      <a:font script="Hang" typeface="맑은 고딕"/>
+      <a:font script="Hans" typeface="宋体"/>
+      <a:font script="Hant" typeface="新細明體"/>
+      <a:font script="Arab" typeface="Times New Roman"/>
+      <a:font script="Hebr" typeface="Times New Roman"/>
+      <a:font script="Thai" typeface="Tahoma"/>
+      <a:font script="Ethi" typeface="Nyala"/>
+      <a:font script="Beng" typeface="Vrinda"/>
+      <a:font script="Gujr" typeface="Shruti"/>
+      <a:font script="Khmr" typeface="MoolBoran"/>
+      <a:font script="Knda" typeface="Tunga"/>
+      <a:font script="Guru" typeface="Raavi"/>
+      <a:font script="Cans" typeface="Euphemia"/>
+      <a:font script="Cher" typeface="Plantagenet Cherokee"/>
+      <a:font script="Yiii" typeface="Microsoft Yi Baiti"/>
+      <a:font script="Tibt" typeface="Microsoft Himalaya"/>
+      <a:font script="Thaa" typeface="MV Boli"/>
+      <a:font script="Deva" typeface="Mangal"/>
+      <a:font script="Telu" typeface="Gautami"/>
+      <a:font script="Taml" typeface="Latha"/>
+      <a:font script="Syrc" typeface="Estrangelo Edessa"/>
+      <a:font script="Orya" typeface="Kalinga"/>
+      <a:font script="Mlym" typeface="Kartika"/>
+      <a:font script="Laoo" typeface="DokChampa"/>
+      <a:font script="Sinh" typeface="Iskoola Pota"/>
+      <a:font script="Mong" typeface="Mongolian Baiti"/>
+      <a:font script="Viet" typeface="Times New Roman"/>
+      <a:font script="Uigh" typeface="Microsoft Uighur"/>
+      <a:font script="Geor" typeface="Sylfaen"/>
+    </a:majorFont>
+    <a:minorFont>
+      <a:latin typeface="Calibri" panose="020F0502020204030204"/>
+      <a:ea typeface=""/>
+      <a:cs typeface=""/>
+      <a:font script="Jpan" typeface="ＭＳ Ｐゴシック"/>
+      <a:font script="Hang" typeface="맑은 고딕"/>
+      <a:font script="Hans" typeface="宋体"/>
+      <a:font script="Hant" typeface="新細明體"/>
+      <a:font script="Arab" typeface="Arial"/>
+      <a:font script="Hebr" typeface="Arial"/>
+      <a:font script="Thai" typeface="Tahoma"/>
+      <a:font script="Ethi" typeface="Nyala"/>
+      <a:font script="Beng" typeface="Vrinda"/>
+      <a:font script="Gujr" typeface="Shruti"/>
+      <a:font script="Khmr" typeface="DaunPenh"/>
+      <a:font script="Knda" typeface="Tunga"/>
+      <a:font script="Guru" typeface="Raavi"/>
+      <a:font script="Cans" typeface="Euphemia"/>
+      <a:font script="Cher" typeface="Plantagenet Cherokee"/>
+      <a:font script="Yiii" typeface="Microsoft Yi Baiti"/>
+      <a:font script="Tibt" typeface="Microsoft Himalaya"/>
+      <a:font script="Thaa" typeface="MV Boli"/>
+      <a:font script="Deva" typeface="Mangal"/>
+      <a:font script="Telu" typeface="Gautami"/>
+      <a:font script="Taml" typeface="Latha"/>
+      <a:font script="Syrc" typeface="Estrangelo Edessa"/>
+      <a:font script="Orya" typeface="Kalinga"/>
+      <a:font script="Mlym" typeface="Kartika"/>
+      <a:font script="Laoo" typeface="DokChampa"/>
+      <a:font script="Sinh" typeface="Iskoola Pota"/>
+      <a:font script="Mong" typeface="Mongolian Baiti"/>
+      <a:font script="Viet" typeface="Arial"/>
+      <a:font script="Uigh" typeface="Microsoft Uighur"/>
+      <a:font script="Geor" typeface="Sylfaen"/>
+    </a:minorFont>
+  </a:fontScheme>
+  <a:fmtScheme name="Office">
+    <a:fillStyleLst>
+      <a:solidFill>
+        <a:schemeClr val="phClr"/>
+      </a:solidFill>
+      <a:gradFill rotWithShape="1">
+        <a:gsLst>
+          <a:gs pos="0">
+            <a:schemeClr val="phClr">
+              <a:lumMod val="110000"/>
+              <a:satMod val="105000"/>
+              <a:tint val="67000"/>
+            </a:schemeClr>
+          </a:gs>
+          <a:gs pos="50000">
+            <a:schemeClr val="phClr">
+              <a:lumMod val="105000"/>
+              <a:satMod val="103000"/>
+              <a:tint val="73000"/>
+            </a:schemeClr>
+          </a:gs>
+          <a:gs pos="100000">
+            <a:schemeClr val="phClr">
+              <a:lumMod val="105000"/>
+              <a:satMod val="109000"/>
+              <a:tint val="81000"/>
+            </a:schemeClr>
+          </a:gs>
+        </a:gsLst>
+        <a:lin ang="5400000" scaled="0"/>
+      </a:gradFill>
+      <a:gradFill rotWithShape="1">
+        <a:gsLst>
+          <a:gs pos="0">
+            <a:schemeClr val="phClr">
+              <a:satMod val="103000"/>
+              <a:lumMod val="102000"/>
+              <a:tint val="94000"/>
+            </a:schemeClr>
+          </a:gs>
+          <a:gs pos="50000">
+            <a:schemeClr val="phClr">
+              <a:satMod val="110000"/>
+              <a:lumMod val="100000"/>
+              <a:shade val="100000"/>
+            </a:schemeClr>
+          </a:gs>
+          <a:gs pos="100000">
+            <a:schemeClr val="phClr">
+              <a:lumMod val="99000"/>
+              <a:satMod val="120000"/>
+              <a:shade val="78000"/>
+            </a:schemeClr>
+          </a:gs>
+        </a:gsLst>
+        <a:lin ang="5400000" scaled="0"/>
+      </a:gradFill>
+    </a:fillStyleLst>
+    <a:lnStyleLst>
+      <a:ln w="6350" cap="flat" cmpd="sng" algn="ctr">
+        <a:solidFill>
+          <a:schemeClr val="phClr"/>
+        </a:solidFill>
+        <a:prstDash val="solid"/>
+        <a:miter lim="800000"/>
+      </a:ln>
+      <a:ln w="12700" cap="flat" cmpd="sng" algn="ctr">
+        <a:solidFill>
+          <a:schemeClr val="phClr"/>
+        </a:solidFill>
+        <a:prstDash val="solid"/>
+        <a:miter lim="800000"/>
+      </a:ln>
+      <a:ln w="19050" cap="flat" cmpd="sng" algn="ctr">
+        <a:solidFill>
+          <a:schemeClr val="phClr"/>
+        </a:solidFill>
+        <a:prstDash val="solid"/>
+        <a:miter lim="800000"/>
+      </a:ln>
+    </a:lnStyleLst>
+    <a:effectStyleLst>
+      <a:effectStyle>
+        <a:effectLst/>
+      </a:effectStyle>
+      <a:effectStyle>
+        <a:effectLst/>
+      </a:effectStyle>
+      <a:effectStyle>
+        <a:effectLst>
+          <a:outerShdw blurRad="57150" dist="19050" dir="5400000" algn="ctr" rotWithShape="0">
+            <a:srgbClr val="000000">
+              <a:alpha val="63000"/>
+            </a:srgbClr>
+          </a:outerShdw>
+        </a:effectLst>
+      </a:effectStyle>
+    </a:effectStyleLst>
+    <a:bgFillStyleLst>
+      <a:solidFill>
+        <a:schemeClr val="phClr"/>
+      </a:solidFill>
+      <a:solidFill>
+        <a:schemeClr val="phClr">
+          <a:tint val="95000"/>
+          <a:satMod val="170000"/>
+        </a:schemeClr>
+      </a:solidFill>
+      <a:gradFill rotWithShape="1">
+        <a:gsLst>
+          <a:gs pos="0">
+            <a:schemeClr val="phClr">
+              <a:tint val="93000"/>
+              <a:satMod val="150000"/>
+              <a:shade val="98000"/>
+              <a:lumMod val="102000"/>
+            </a:schemeClr>
+          </a:gs>
+          <a:gs pos="50000">
+            <a:schemeClr val="phClr">
+              <a:tint val="98000"/>
+              <a:satMod val="130000"/>
+              <a:shade val="90000"/>
+              <a:lumMod val="103000"/>
+            </a:schemeClr>
+          </a:gs>
+          <a:gs pos="100000">
+            <a:schemeClr val="phClr">
+              <a:shade val="63000"/>
+              <a:satMod val="120000"/>
+            </a:schemeClr>
+          </a:gs>
+        </a:gsLst>
+        <a:lin ang="5400000" scaled="0"/>
+      </a:gradFill>
+    </a:bgFillStyleLst>
+  </a:fmtScheme>
+</a:themeOverride>
 </file>
</xml_diff>

<commit_message>
Kommentare zu A1+A2+A5 hinzugefügt; Material zu A1+A2 hinzugefügt
</commit_message>
<xml_diff>
--- a/uebung06/hcs_2013_uebung06.pptx
+++ b/uebung06/hcs_2013_uebung06.pptx
@@ -12273,10 +12273,9 @@
               <a:buChar char="•"/>
             </a:pPr>
             <a:r>
-              <a:rPr lang="de-DE" sz="1600" smtClean="0"/>
+              <a:rPr lang="de-DE" sz="1600" dirty="0" smtClean="0"/>
               <a:t>n abhängig von Kernel- / Boxgröße</a:t>
             </a:r>
-            <a:endParaRPr lang="de-DE" sz="1600" dirty="0" smtClean="0"/>
           </a:p>
         </p:txBody>
       </p:sp>
@@ -17410,6 +17409,44 @@
           </a:graphicData>
         </a:graphic>
       </p:graphicFrame>
+      <p:sp>
+        <p:nvSpPr>
+          <p:cNvPr id="10" name="TextBox 9"/>
+          <p:cNvSpPr txBox="1"/>
+          <p:nvPr/>
+        </p:nvSpPr>
+        <p:spPr>
+          <a:xfrm>
+            <a:off x="5436096" y="1778333"/>
+            <a:ext cx="3384376" cy="282516"/>
+          </a:xfrm>
+          <a:prstGeom prst="rect">
+            <a:avLst/>
+          </a:prstGeom>
+          <a:noFill/>
+        </p:spPr>
+        <p:txBody>
+          <a:bodyPr wrap="square" rtlCol="0">
+            <a:spAutoFit/>
+          </a:bodyPr>
+          <a:lstStyle/>
+          <a:p>
+            <a:r>
+              <a:rPr lang="de-DE" sz="1200" b="1" dirty="0" smtClean="0">
+                <a:solidFill>
+                  <a:srgbClr val="FF0000"/>
+                </a:solidFill>
+              </a:rPr>
+              <a:t>TODO: Argumentation nochmal überprüfen!</a:t>
+            </a:r>
+            <a:endParaRPr lang="en-US" sz="1200" b="1" dirty="0">
+              <a:solidFill>
+                <a:srgbClr val="FF0000"/>
+              </a:solidFill>
+            </a:endParaRPr>
+          </a:p>
+        </p:txBody>
+      </p:sp>
     </p:spTree>
     <p:extLst>
       <p:ext uri="{BB962C8B-B14F-4D97-AF65-F5344CB8AC3E}">
@@ -17587,6 +17624,44 @@
           </a:p>
         </p:txBody>
       </p:sp>
+      <p:sp>
+        <p:nvSpPr>
+          <p:cNvPr id="5" name="TextBox 4"/>
+          <p:cNvSpPr txBox="1"/>
+          <p:nvPr/>
+        </p:nvSpPr>
+        <p:spPr>
+          <a:xfrm>
+            <a:off x="5436096" y="2974550"/>
+            <a:ext cx="3384376" cy="461665"/>
+          </a:xfrm>
+          <a:prstGeom prst="rect">
+            <a:avLst/>
+          </a:prstGeom>
+          <a:noFill/>
+        </p:spPr>
+        <p:txBody>
+          <a:bodyPr wrap="square" rtlCol="0">
+            <a:spAutoFit/>
+          </a:bodyPr>
+          <a:lstStyle/>
+          <a:p>
+            <a:r>
+              <a:rPr lang="de-DE" sz="1200" b="1" dirty="0" smtClean="0">
+                <a:solidFill>
+                  <a:srgbClr val="FF0000"/>
+                </a:solidFill>
+              </a:rPr>
+              <a:t>HINWEIS: ist garnicht so trivial, spielt mal mit gimp oder so ein wenig rum</a:t>
+            </a:r>
+            <a:endParaRPr lang="en-US" sz="1200" b="1" dirty="0">
+              <a:solidFill>
+                <a:srgbClr val="FF0000"/>
+              </a:solidFill>
+            </a:endParaRPr>
+          </a:p>
+        </p:txBody>
+      </p:sp>
     </p:spTree>
     <p:extLst>
       <p:ext uri="{BB962C8B-B14F-4D97-AF65-F5344CB8AC3E}">
@@ -17662,7 +17737,83 @@
           <a:bodyPr/>
           <a:lstStyle/>
           <a:p>
-            <a:endParaRPr lang="en-US"/>
+            <a:endParaRPr lang="en-US" dirty="0"/>
+          </a:p>
+        </p:txBody>
+      </p:sp>
+      <p:sp>
+        <p:nvSpPr>
+          <p:cNvPr id="5" name="TextBox 4"/>
+          <p:cNvSpPr txBox="1"/>
+          <p:nvPr/>
+        </p:nvSpPr>
+        <p:spPr>
+          <a:xfrm>
+            <a:off x="5436096" y="1778333"/>
+            <a:ext cx="3384376" cy="1015663"/>
+          </a:xfrm>
+          <a:prstGeom prst="rect">
+            <a:avLst/>
+          </a:prstGeom>
+          <a:noFill/>
+        </p:spPr>
+        <p:txBody>
+          <a:bodyPr wrap="square" rtlCol="0">
+            <a:spAutoFit/>
+          </a:bodyPr>
+          <a:lstStyle/>
+          <a:p>
+            <a:r>
+              <a:rPr lang="de-DE" sz="1200" b="1" dirty="0" smtClean="0">
+                <a:solidFill>
+                  <a:srgbClr val="FF0000"/>
+                </a:solidFill>
+              </a:rPr>
+              <a:t>HINWEIS: ohne Veränderung des Bildinhaltes ändert sich am jpeg garnichts, selbst wenn man es 100mal hintereinander mit einer Qualität von 20% als jpeg encoded (selber getestet mit imagemagick)</a:t>
+            </a:r>
+            <a:endParaRPr lang="en-US" sz="1200" b="1" dirty="0">
+              <a:solidFill>
+                <a:srgbClr val="FF0000"/>
+              </a:solidFill>
+            </a:endParaRPr>
+          </a:p>
+        </p:txBody>
+      </p:sp>
+      <p:sp>
+        <p:nvSpPr>
+          <p:cNvPr id="6" name="TextBox 5"/>
+          <p:cNvSpPr txBox="1"/>
+          <p:nvPr/>
+        </p:nvSpPr>
+        <p:spPr>
+          <a:xfrm>
+            <a:off x="5436096" y="2974550"/>
+            <a:ext cx="3384376" cy="646331"/>
+          </a:xfrm>
+          <a:prstGeom prst="rect">
+            <a:avLst/>
+          </a:prstGeom>
+          <a:noFill/>
+        </p:spPr>
+        <p:txBody>
+          <a:bodyPr wrap="square" rtlCol="0">
+            <a:spAutoFit/>
+          </a:bodyPr>
+          <a:lstStyle/>
+          <a:p>
+            <a:r>
+              <a:rPr lang="de-DE" sz="1200" b="1" dirty="0" smtClean="0">
+                <a:solidFill>
+                  <a:srgbClr val="FF0000"/>
+                </a:solidFill>
+              </a:rPr>
+              <a:t>HINWEIS: mit Veränderungen (mehrmals etwas Text eingefügt) ändert sich nach 5maligem Ändern auch nichts!</a:t>
+            </a:r>
+            <a:endParaRPr lang="en-US" sz="1200" b="1" dirty="0">
+              <a:solidFill>
+                <a:srgbClr val="FF0000"/>
+              </a:solidFill>
+            </a:endParaRPr>
           </a:p>
         </p:txBody>
       </p:sp>
@@ -17755,7 +17906,7 @@
           <a:graphicData uri="http://schemas.openxmlformats.org/presentationml/2006/ole">
             <mc:AlternateContent xmlns:mc="http://schemas.openxmlformats.org/markup-compatibility/2006">
               <mc:Choice xmlns:v="urn:schemas-microsoft-com:vml" Requires="v">
-                <p:oleObj spid="_x0000_s1061" name="Worksheet" r:id="rId3" imgW="2857451" imgH="1409758" progId="Excel.Sheet.12">
+                <p:oleObj spid="_x0000_s1066" name="Worksheet" r:id="rId3" imgW="2857451" imgH="1409758" progId="Excel.Sheet.12">
                   <p:embed/>
                 </p:oleObj>
               </mc:Choice>
@@ -17872,7 +18023,7 @@
           <a:graphicData uri="http://schemas.openxmlformats.org/presentationml/2006/ole">
             <mc:AlternateContent xmlns:mc="http://schemas.openxmlformats.org/markup-compatibility/2006">
               <mc:Choice xmlns:v="urn:schemas-microsoft-com:vml" Requires="v">
-                <p:oleObj spid="_x0000_s2084" name="Worksheet" r:id="rId3" imgW="2857451" imgH="1409758" progId="Excel.Sheet.12">
+                <p:oleObj spid="_x0000_s2089" name="Worksheet" r:id="rId3" imgW="2857451" imgH="1409758" progId="Excel.Sheet.12">
                   <p:embed/>
                 </p:oleObj>
               </mc:Choice>
@@ -17989,7 +18140,7 @@
           <a:graphicData uri="http://schemas.openxmlformats.org/presentationml/2006/ole">
             <mc:AlternateContent xmlns:mc="http://schemas.openxmlformats.org/markup-compatibility/2006">
               <mc:Choice xmlns:v="urn:schemas-microsoft-com:vml" Requires="v">
-                <p:oleObj spid="_x0000_s3106" name="Worksheet" r:id="rId3" imgW="2857451" imgH="1409758" progId="Excel.Sheet.12">
+                <p:oleObj spid="_x0000_s3111" name="Worksheet" r:id="rId3" imgW="2857451" imgH="1409758" progId="Excel.Sheet.12">
                   <p:embed/>
                 </p:oleObj>
               </mc:Choice>
@@ -18103,7 +18254,7 @@
           <a:graphicData uri="http://schemas.openxmlformats.org/presentationml/2006/ole">
             <mc:AlternateContent xmlns:mc="http://schemas.openxmlformats.org/markup-compatibility/2006">
               <mc:Choice xmlns:v="urn:schemas-microsoft-com:vml" Requires="v">
-                <p:oleObj spid="_x0000_s4124" name="Worksheet" r:id="rId3" imgW="1762035" imgH="1609609" progId="Excel.Sheet.12">
+                <p:oleObj spid="_x0000_s4129" name="Worksheet" r:id="rId3" imgW="1762035" imgH="1609609" progId="Excel.Sheet.12">
                   <p:embed/>
                 </p:oleObj>
               </mc:Choice>

</xml_diff>